<commit_message>
Adding enhancements for W6.1 - Hass Avocado Dashboard - Part 2: Demonstration
</commit_message>
<xml_diff>
--- a/ppl_files/LDSBC_BA280_W6_Hass_Avocado_Dashboard_mv.pptx
+++ b/ppl_files/LDSBC_BA280_W6_Hass_Avocado_Dashboard_mv.pptx
@@ -4555,7 +4555,7 @@
         </p:blipFill>
         <p:spPr>
           <a:xfrm>
-            <a:off x="6257193" y="1898197"/>
+            <a:off x="6203927" y="1898197"/>
             <a:ext cx="5353050" cy="4271963"/>
           </a:xfrm>
           <a:prstGeom prst="rect">
@@ -4638,7 +4638,7 @@
         </p:blipFill>
         <p:spPr>
           <a:xfrm>
-            <a:off x="1028482" y="1575484"/>
+            <a:off x="1072870" y="1575484"/>
             <a:ext cx="4657752" cy="4917391"/>
           </a:xfrm>
           <a:prstGeom prst="rect">

</xml_diff>